<commit_message>
Updated agenda for VS Live 2017 Anaheim
</commit_message>
<xml_diff>
--- a/ATourofSQLServer2016SecurityFeatures.pptx
+++ b/ATourofSQLServer2016SecurityFeatures.pptx
@@ -244,7 +244,7 @@
           <a:p>
             <a:fld id="{D4C1D33F-78D8-4750-A964-FE7F02492D2E}" type="datetimeFigureOut">
               <a:rPr lang="en-US" smtClean="0"/>
-              <a:t>10/16/2017</a:t>
+              <a:t>10/18/2017</a:t>
             </a:fld>
             <a:endParaRPr lang="en-US"/>
           </a:p>
@@ -1916,7 +1916,7 @@
           <a:p>
             <a:fld id="{38B92EED-EC5D-481D-8393-A7289D5F8955}" type="datetimeFigureOut">
               <a:rPr lang="en-US" smtClean="0"/>
-              <a:t>10/16/2017</a:t>
+              <a:t>10/18/2017</a:t>
             </a:fld>
             <a:endParaRPr lang="en-US"/>
           </a:p>
@@ -2085,7 +2085,7 @@
           <a:p>
             <a:fld id="{38B92EED-EC5D-481D-8393-A7289D5F8955}" type="datetimeFigureOut">
               <a:rPr lang="en-US" smtClean="0"/>
-              <a:t>10/16/2017</a:t>
+              <a:t>10/18/2017</a:t>
             </a:fld>
             <a:endParaRPr lang="en-US"/>
           </a:p>
@@ -2264,7 +2264,7 @@
           <a:p>
             <a:fld id="{38B92EED-EC5D-481D-8393-A7289D5F8955}" type="datetimeFigureOut">
               <a:rPr lang="en-US" smtClean="0"/>
-              <a:t>10/16/2017</a:t>
+              <a:t>10/18/2017</a:t>
             </a:fld>
             <a:endParaRPr lang="en-US"/>
           </a:p>
@@ -2505,7 +2505,7 @@
           <a:p>
             <a:fld id="{D088F999-7A4E-6B4F-9FED-EF75B73AD044}" type="datetimeFigureOut">
               <a:rPr lang="en-US" smtClean="0"/>
-              <a:t>10/16/2017</a:t>
+              <a:t>10/18/2017</a:t>
             </a:fld>
             <a:endParaRPr lang="en-US"/>
           </a:p>
@@ -2673,7 +2673,7 @@
           <a:p>
             <a:fld id="{D088F999-7A4E-6B4F-9FED-EF75B73AD044}" type="datetimeFigureOut">
               <a:rPr lang="en-US" smtClean="0"/>
-              <a:t>10/16/2017</a:t>
+              <a:t>10/18/2017</a:t>
             </a:fld>
             <a:endParaRPr lang="en-US"/>
           </a:p>
@@ -2918,7 +2918,7 @@
           <a:p>
             <a:fld id="{D088F999-7A4E-6B4F-9FED-EF75B73AD044}" type="datetimeFigureOut">
               <a:rPr lang="en-US" smtClean="0"/>
-              <a:t>10/16/2017</a:t>
+              <a:t>10/18/2017</a:t>
             </a:fld>
             <a:endParaRPr lang="en-US"/>
           </a:p>
@@ -3203,7 +3203,7 @@
           <a:p>
             <a:fld id="{D088F999-7A4E-6B4F-9FED-EF75B73AD044}" type="datetimeFigureOut">
               <a:rPr lang="en-US" smtClean="0"/>
-              <a:t>10/16/2017</a:t>
+              <a:t>10/18/2017</a:t>
             </a:fld>
             <a:endParaRPr lang="en-US"/>
           </a:p>
@@ -3622,7 +3622,7 @@
           <a:p>
             <a:fld id="{D088F999-7A4E-6B4F-9FED-EF75B73AD044}" type="datetimeFigureOut">
               <a:rPr lang="en-US" smtClean="0"/>
-              <a:t>10/16/2017</a:t>
+              <a:t>10/18/2017</a:t>
             </a:fld>
             <a:endParaRPr lang="en-US"/>
           </a:p>
@@ -3739,7 +3739,7 @@
           <a:p>
             <a:fld id="{D088F999-7A4E-6B4F-9FED-EF75B73AD044}" type="datetimeFigureOut">
               <a:rPr lang="en-US" smtClean="0"/>
-              <a:t>10/16/2017</a:t>
+              <a:t>10/18/2017</a:t>
             </a:fld>
             <a:endParaRPr lang="en-US"/>
           </a:p>
@@ -3834,7 +3834,7 @@
           <a:p>
             <a:fld id="{D088F999-7A4E-6B4F-9FED-EF75B73AD044}" type="datetimeFigureOut">
               <a:rPr lang="en-US" smtClean="0"/>
-              <a:t>10/16/2017</a:t>
+              <a:t>10/18/2017</a:t>
             </a:fld>
             <a:endParaRPr lang="en-US"/>
           </a:p>
@@ -4109,7 +4109,7 @@
           <a:p>
             <a:fld id="{D088F999-7A4E-6B4F-9FED-EF75B73AD044}" type="datetimeFigureOut">
               <a:rPr lang="en-US" smtClean="0"/>
-              <a:t>10/16/2017</a:t>
+              <a:t>10/18/2017</a:t>
             </a:fld>
             <a:endParaRPr lang="en-US"/>
           </a:p>
@@ -4277,7 +4277,7 @@
           <a:p>
             <a:fld id="{38B92EED-EC5D-481D-8393-A7289D5F8955}" type="datetimeFigureOut">
               <a:rPr lang="en-US" smtClean="0"/>
-              <a:t>10/16/2017</a:t>
+              <a:t>10/18/2017</a:t>
             </a:fld>
             <a:endParaRPr lang="en-US"/>
           </a:p>
@@ -4533,7 +4533,7 @@
           <a:p>
             <a:fld id="{D088F999-7A4E-6B4F-9FED-EF75B73AD044}" type="datetimeFigureOut">
               <a:rPr lang="en-US" smtClean="0"/>
-              <a:t>10/16/2017</a:t>
+              <a:t>10/18/2017</a:t>
             </a:fld>
             <a:endParaRPr lang="en-US"/>
           </a:p>
@@ -4701,7 +4701,7 @@
           <a:p>
             <a:fld id="{D088F999-7A4E-6B4F-9FED-EF75B73AD044}" type="datetimeFigureOut">
               <a:rPr lang="en-US" smtClean="0"/>
-              <a:t>10/16/2017</a:t>
+              <a:t>10/18/2017</a:t>
             </a:fld>
             <a:endParaRPr lang="en-US"/>
           </a:p>
@@ -4879,7 +4879,7 @@
           <a:p>
             <a:fld id="{D088F999-7A4E-6B4F-9FED-EF75B73AD044}" type="datetimeFigureOut">
               <a:rPr lang="en-US" smtClean="0"/>
-              <a:t>10/16/2017</a:t>
+              <a:t>10/18/2017</a:t>
             </a:fld>
             <a:endParaRPr lang="en-US"/>
           </a:p>
@@ -5119,7 +5119,7 @@
             <a:fld id="{3FE51E94-D08C-431E-88FC-7EB62E529A19}" type="datetimeFigureOut">
               <a:rPr lang="en-US" smtClean="0"/>
               <a:pPr/>
-              <a:t>10/16/2017</a:t>
+              <a:t>10/18/2017</a:t>
             </a:fld>
             <a:endParaRPr lang="en-US"/>
           </a:p>
@@ -5289,7 +5289,7 @@
             <a:fld id="{3FE51E94-D08C-431E-88FC-7EB62E529A19}" type="datetimeFigureOut">
               <a:rPr lang="en-US" smtClean="0"/>
               <a:pPr/>
-              <a:t>10/16/2017</a:t>
+              <a:t>10/18/2017</a:t>
             </a:fld>
             <a:endParaRPr lang="en-US"/>
           </a:p>
@@ -5536,7 +5536,7 @@
             <a:fld id="{3FE51E94-D08C-431E-88FC-7EB62E529A19}" type="datetimeFigureOut">
               <a:rPr lang="en-US" smtClean="0"/>
               <a:pPr/>
-              <a:t>10/16/2017</a:t>
+              <a:t>10/18/2017</a:t>
             </a:fld>
             <a:endParaRPr lang="en-US"/>
           </a:p>
@@ -5823,7 +5823,7 @@
             <a:fld id="{3FE51E94-D08C-431E-88FC-7EB62E529A19}" type="datetimeFigureOut">
               <a:rPr lang="en-US" smtClean="0"/>
               <a:pPr/>
-              <a:t>10/16/2017</a:t>
+              <a:t>10/18/2017</a:t>
             </a:fld>
             <a:endParaRPr lang="en-US"/>
           </a:p>
@@ -6249,7 +6249,7 @@
             <a:fld id="{3FE51E94-D08C-431E-88FC-7EB62E529A19}" type="datetimeFigureOut">
               <a:rPr lang="en-US" smtClean="0"/>
               <a:pPr/>
-              <a:t>10/16/2017</a:t>
+              <a:t>10/18/2017</a:t>
             </a:fld>
             <a:endParaRPr lang="en-US"/>
           </a:p>
@@ -6368,7 +6368,7 @@
             <a:fld id="{3FE51E94-D08C-431E-88FC-7EB62E529A19}" type="datetimeFigureOut">
               <a:rPr lang="en-US" smtClean="0"/>
               <a:pPr/>
-              <a:t>10/16/2017</a:t>
+              <a:t>10/18/2017</a:t>
             </a:fld>
             <a:endParaRPr lang="en-US"/>
           </a:p>
@@ -6465,7 +6465,7 @@
             <a:fld id="{3FE51E94-D08C-431E-88FC-7EB62E529A19}" type="datetimeFigureOut">
               <a:rPr lang="en-US" smtClean="0"/>
               <a:pPr/>
-              <a:t>10/16/2017</a:t>
+              <a:t>10/18/2017</a:t>
             </a:fld>
             <a:endParaRPr lang="en-US"/>
           </a:p>
@@ -6711,7 +6711,7 @@
           <a:p>
             <a:fld id="{38B92EED-EC5D-481D-8393-A7289D5F8955}" type="datetimeFigureOut">
               <a:rPr lang="en-US" smtClean="0"/>
-              <a:t>10/16/2017</a:t>
+              <a:t>10/18/2017</a:t>
             </a:fld>
             <a:endParaRPr lang="en-US"/>
           </a:p>
@@ -6988,7 +6988,7 @@
             <a:fld id="{3FE51E94-D08C-431E-88FC-7EB62E529A19}" type="datetimeFigureOut">
               <a:rPr lang="en-US" smtClean="0"/>
               <a:pPr/>
-              <a:t>10/16/2017</a:t>
+              <a:t>10/18/2017</a:t>
             </a:fld>
             <a:endParaRPr lang="en-US"/>
           </a:p>
@@ -7245,7 +7245,7 @@
             <a:fld id="{3FE51E94-D08C-431E-88FC-7EB62E529A19}" type="datetimeFigureOut">
               <a:rPr lang="en-US" smtClean="0"/>
               <a:pPr/>
-              <a:t>10/16/2017</a:t>
+              <a:t>10/18/2017</a:t>
             </a:fld>
             <a:endParaRPr lang="en-US"/>
           </a:p>
@@ -7415,7 +7415,7 @@
             <a:fld id="{3FE51E94-D08C-431E-88FC-7EB62E529A19}" type="datetimeFigureOut">
               <a:rPr lang="en-US" smtClean="0"/>
               <a:pPr/>
-              <a:t>10/16/2017</a:t>
+              <a:t>10/18/2017</a:t>
             </a:fld>
             <a:endParaRPr lang="en-US"/>
           </a:p>
@@ -7595,7 +7595,7 @@
             <a:fld id="{3FE51E94-D08C-431E-88FC-7EB62E529A19}" type="datetimeFigureOut">
               <a:rPr lang="en-US" smtClean="0"/>
               <a:pPr/>
-              <a:t>10/16/2017</a:t>
+              <a:t>10/18/2017</a:t>
             </a:fld>
             <a:endParaRPr lang="en-US"/>
           </a:p>
@@ -8004,7 +8004,7 @@
           <a:p>
             <a:fld id="{D088F999-7A4E-6B4F-9FED-EF75B73AD044}" type="datetimeFigureOut">
               <a:rPr lang="en-US" smtClean="0"/>
-              <a:t>10/16/2017</a:t>
+              <a:t>10/18/2017</a:t>
             </a:fld>
             <a:endParaRPr lang="en-US"/>
           </a:p>
@@ -8172,7 +8172,7 @@
           <a:p>
             <a:fld id="{D088F999-7A4E-6B4F-9FED-EF75B73AD044}" type="datetimeFigureOut">
               <a:rPr lang="en-US" smtClean="0"/>
-              <a:t>10/16/2017</a:t>
+              <a:t>10/18/2017</a:t>
             </a:fld>
             <a:endParaRPr lang="en-US"/>
           </a:p>
@@ -8417,7 +8417,7 @@
           <a:p>
             <a:fld id="{D088F999-7A4E-6B4F-9FED-EF75B73AD044}" type="datetimeFigureOut">
               <a:rPr lang="en-US" smtClean="0"/>
-              <a:t>10/16/2017</a:t>
+              <a:t>10/18/2017</a:t>
             </a:fld>
             <a:endParaRPr lang="en-US"/>
           </a:p>
@@ -8702,7 +8702,7 @@
           <a:p>
             <a:fld id="{38B92EED-EC5D-481D-8393-A7289D5F8955}" type="datetimeFigureOut">
               <a:rPr lang="en-US" smtClean="0"/>
-              <a:t>10/16/2017</a:t>
+              <a:t>10/18/2017</a:t>
             </a:fld>
             <a:endParaRPr lang="en-US"/>
           </a:p>
@@ -8988,7 +8988,7 @@
           <a:p>
             <a:fld id="{D088F999-7A4E-6B4F-9FED-EF75B73AD044}" type="datetimeFigureOut">
               <a:rPr lang="en-US" smtClean="0"/>
-              <a:t>10/16/2017</a:t>
+              <a:t>10/18/2017</a:t>
             </a:fld>
             <a:endParaRPr lang="en-US"/>
           </a:p>
@@ -9407,7 +9407,7 @@
           <a:p>
             <a:fld id="{D088F999-7A4E-6B4F-9FED-EF75B73AD044}" type="datetimeFigureOut">
               <a:rPr lang="en-US" smtClean="0"/>
-              <a:t>10/16/2017</a:t>
+              <a:t>10/18/2017</a:t>
             </a:fld>
             <a:endParaRPr lang="en-US"/>
           </a:p>
@@ -9524,7 +9524,7 @@
           <a:p>
             <a:fld id="{D088F999-7A4E-6B4F-9FED-EF75B73AD044}" type="datetimeFigureOut">
               <a:rPr lang="en-US" smtClean="0"/>
-              <a:t>10/16/2017</a:t>
+              <a:t>10/18/2017</a:t>
             </a:fld>
             <a:endParaRPr lang="en-US"/>
           </a:p>
@@ -9619,7 +9619,7 @@
           <a:p>
             <a:fld id="{D088F999-7A4E-6B4F-9FED-EF75B73AD044}" type="datetimeFigureOut">
               <a:rPr lang="en-US" smtClean="0"/>
-              <a:t>10/16/2017</a:t>
+              <a:t>10/18/2017</a:t>
             </a:fld>
             <a:endParaRPr lang="en-US"/>
           </a:p>
@@ -9894,7 +9894,7 @@
           <a:p>
             <a:fld id="{D088F999-7A4E-6B4F-9FED-EF75B73AD044}" type="datetimeFigureOut">
               <a:rPr lang="en-US" smtClean="0"/>
-              <a:t>10/16/2017</a:t>
+              <a:t>10/18/2017</a:t>
             </a:fld>
             <a:endParaRPr lang="en-US"/>
           </a:p>
@@ -10149,7 +10149,7 @@
           <a:p>
             <a:fld id="{D088F999-7A4E-6B4F-9FED-EF75B73AD044}" type="datetimeFigureOut">
               <a:rPr lang="en-US" smtClean="0"/>
-              <a:t>10/16/2017</a:t>
+              <a:t>10/18/2017</a:t>
             </a:fld>
             <a:endParaRPr lang="en-US"/>
           </a:p>
@@ -10317,7 +10317,7 @@
           <a:p>
             <a:fld id="{D088F999-7A4E-6B4F-9FED-EF75B73AD044}" type="datetimeFigureOut">
               <a:rPr lang="en-US" smtClean="0"/>
-              <a:t>10/16/2017</a:t>
+              <a:t>10/18/2017</a:t>
             </a:fld>
             <a:endParaRPr lang="en-US"/>
           </a:p>
@@ -10495,7 +10495,7 @@
           <a:p>
             <a:fld id="{D088F999-7A4E-6B4F-9FED-EF75B73AD044}" type="datetimeFigureOut">
               <a:rPr lang="en-US" smtClean="0"/>
-              <a:t>10/16/2017</a:t>
+              <a:t>10/18/2017</a:t>
             </a:fld>
             <a:endParaRPr lang="en-US"/>
           </a:p>
@@ -10735,7 +10735,7 @@
             <a:fld id="{3FE51E94-D08C-431E-88FC-7EB62E529A19}" type="datetimeFigureOut">
               <a:rPr lang="en-US" smtClean="0"/>
               <a:pPr/>
-              <a:t>10/16/2017</a:t>
+              <a:t>10/18/2017</a:t>
             </a:fld>
             <a:endParaRPr lang="en-US"/>
           </a:p>
@@ -10905,7 +10905,7 @@
             <a:fld id="{3FE51E94-D08C-431E-88FC-7EB62E529A19}" type="datetimeFigureOut">
               <a:rPr lang="en-US" smtClean="0"/>
               <a:pPr/>
-              <a:t>10/16/2017</a:t>
+              <a:t>10/18/2017</a:t>
             </a:fld>
             <a:endParaRPr lang="en-US"/>
           </a:p>
@@ -11325,7 +11325,7 @@
           <a:p>
             <a:fld id="{38B92EED-EC5D-481D-8393-A7289D5F8955}" type="datetimeFigureOut">
               <a:rPr lang="en-US" smtClean="0"/>
-              <a:t>10/16/2017</a:t>
+              <a:t>10/18/2017</a:t>
             </a:fld>
             <a:endParaRPr lang="en-US"/>
           </a:p>
@@ -11572,7 +11572,7 @@
             <a:fld id="{3FE51E94-D08C-431E-88FC-7EB62E529A19}" type="datetimeFigureOut">
               <a:rPr lang="en-US" smtClean="0"/>
               <a:pPr/>
-              <a:t>10/16/2017</a:t>
+              <a:t>10/18/2017</a:t>
             </a:fld>
             <a:endParaRPr lang="en-US"/>
           </a:p>
@@ -11859,7 +11859,7 @@
             <a:fld id="{3FE51E94-D08C-431E-88FC-7EB62E529A19}" type="datetimeFigureOut">
               <a:rPr lang="en-US" smtClean="0"/>
               <a:pPr/>
-              <a:t>10/16/2017</a:t>
+              <a:t>10/18/2017</a:t>
             </a:fld>
             <a:endParaRPr lang="en-US"/>
           </a:p>
@@ -12285,7 +12285,7 @@
             <a:fld id="{3FE51E94-D08C-431E-88FC-7EB62E529A19}" type="datetimeFigureOut">
               <a:rPr lang="en-US" smtClean="0"/>
               <a:pPr/>
-              <a:t>10/16/2017</a:t>
+              <a:t>10/18/2017</a:t>
             </a:fld>
             <a:endParaRPr lang="en-US"/>
           </a:p>
@@ -12404,7 +12404,7 @@
             <a:fld id="{3FE51E94-D08C-431E-88FC-7EB62E529A19}" type="datetimeFigureOut">
               <a:rPr lang="en-US" smtClean="0"/>
               <a:pPr/>
-              <a:t>10/16/2017</a:t>
+              <a:t>10/18/2017</a:t>
             </a:fld>
             <a:endParaRPr lang="en-US"/>
           </a:p>
@@ -12501,7 +12501,7 @@
             <a:fld id="{3FE51E94-D08C-431E-88FC-7EB62E529A19}" type="datetimeFigureOut">
               <a:rPr lang="en-US" smtClean="0"/>
               <a:pPr/>
-              <a:t>10/16/2017</a:t>
+              <a:t>10/18/2017</a:t>
             </a:fld>
             <a:endParaRPr lang="en-US"/>
           </a:p>
@@ -12778,7 +12778,7 @@
             <a:fld id="{3FE51E94-D08C-431E-88FC-7EB62E529A19}" type="datetimeFigureOut">
               <a:rPr lang="en-US" smtClean="0"/>
               <a:pPr/>
-              <a:t>10/16/2017</a:t>
+              <a:t>10/18/2017</a:t>
             </a:fld>
             <a:endParaRPr lang="en-US"/>
           </a:p>
@@ -13035,7 +13035,7 @@
             <a:fld id="{3FE51E94-D08C-431E-88FC-7EB62E529A19}" type="datetimeFigureOut">
               <a:rPr lang="en-US" smtClean="0"/>
               <a:pPr/>
-              <a:t>10/16/2017</a:t>
+              <a:t>10/18/2017</a:t>
             </a:fld>
             <a:endParaRPr lang="en-US"/>
           </a:p>
@@ -13205,7 +13205,7 @@
             <a:fld id="{3FE51E94-D08C-431E-88FC-7EB62E529A19}" type="datetimeFigureOut">
               <a:rPr lang="en-US" smtClean="0"/>
               <a:pPr/>
-              <a:t>10/16/2017</a:t>
+              <a:t>10/18/2017</a:t>
             </a:fld>
             <a:endParaRPr lang="en-US"/>
           </a:p>
@@ -13385,7 +13385,7 @@
             <a:fld id="{3FE51E94-D08C-431E-88FC-7EB62E529A19}" type="datetimeFigureOut">
               <a:rPr lang="en-US" smtClean="0"/>
               <a:pPr/>
-              <a:t>10/16/2017</a:t>
+              <a:t>10/18/2017</a:t>
             </a:fld>
             <a:endParaRPr lang="en-US"/>
           </a:p>
@@ -13559,7 +13559,7 @@
           <a:p>
             <a:fld id="{38B92EED-EC5D-481D-8393-A7289D5F8955}" type="datetimeFigureOut">
               <a:rPr lang="en-US" smtClean="0"/>
-              <a:t>10/16/2017</a:t>
+              <a:t>10/18/2017</a:t>
             </a:fld>
             <a:endParaRPr lang="en-US"/>
           </a:p>
@@ -13912,7 +13912,7 @@
           <a:p>
             <a:fld id="{D088F999-7A4E-6B4F-9FED-EF75B73AD044}" type="datetimeFigureOut">
               <a:rPr lang="en-US" smtClean="0"/>
-              <a:t>10/16/2017</a:t>
+              <a:t>10/18/2017</a:t>
             </a:fld>
             <a:endParaRPr lang="en-US"/>
           </a:p>
@@ -14080,7 +14080,7 @@
           <a:p>
             <a:fld id="{D088F999-7A4E-6B4F-9FED-EF75B73AD044}" type="datetimeFigureOut">
               <a:rPr lang="en-US" smtClean="0"/>
-              <a:t>10/16/2017</a:t>
+              <a:t>10/18/2017</a:t>
             </a:fld>
             <a:endParaRPr lang="en-US"/>
           </a:p>
@@ -14325,7 +14325,7 @@
           <a:p>
             <a:fld id="{D088F999-7A4E-6B4F-9FED-EF75B73AD044}" type="datetimeFigureOut">
               <a:rPr lang="en-US" smtClean="0"/>
-              <a:t>10/16/2017</a:t>
+              <a:t>10/18/2017</a:t>
             </a:fld>
             <a:endParaRPr lang="en-US"/>
           </a:p>
@@ -14610,7 +14610,7 @@
           <a:p>
             <a:fld id="{D088F999-7A4E-6B4F-9FED-EF75B73AD044}" type="datetimeFigureOut">
               <a:rPr lang="en-US" smtClean="0"/>
-              <a:t>10/16/2017</a:t>
+              <a:t>10/18/2017</a:t>
             </a:fld>
             <a:endParaRPr lang="en-US"/>
           </a:p>
@@ -15029,7 +15029,7 @@
           <a:p>
             <a:fld id="{D088F999-7A4E-6B4F-9FED-EF75B73AD044}" type="datetimeFigureOut">
               <a:rPr lang="en-US" smtClean="0"/>
-              <a:t>10/16/2017</a:t>
+              <a:t>10/18/2017</a:t>
             </a:fld>
             <a:endParaRPr lang="en-US"/>
           </a:p>
@@ -15146,7 +15146,7 @@
           <a:p>
             <a:fld id="{D088F999-7A4E-6B4F-9FED-EF75B73AD044}" type="datetimeFigureOut">
               <a:rPr lang="en-US" smtClean="0"/>
-              <a:t>10/16/2017</a:t>
+              <a:t>10/18/2017</a:t>
             </a:fld>
             <a:endParaRPr lang="en-US"/>
           </a:p>
@@ -15241,7 +15241,7 @@
           <a:p>
             <a:fld id="{D088F999-7A4E-6B4F-9FED-EF75B73AD044}" type="datetimeFigureOut">
               <a:rPr lang="en-US" smtClean="0"/>
-              <a:t>10/16/2017</a:t>
+              <a:t>10/18/2017</a:t>
             </a:fld>
             <a:endParaRPr lang="en-US"/>
           </a:p>
@@ -15516,7 +15516,7 @@
           <a:p>
             <a:fld id="{D088F999-7A4E-6B4F-9FED-EF75B73AD044}" type="datetimeFigureOut">
               <a:rPr lang="en-US" smtClean="0"/>
-              <a:t>10/16/2017</a:t>
+              <a:t>10/18/2017</a:t>
             </a:fld>
             <a:endParaRPr lang="en-US"/>
           </a:p>
@@ -15611,7 +15611,7 @@
           <a:p>
             <a:fld id="{38B92EED-EC5D-481D-8393-A7289D5F8955}" type="datetimeFigureOut">
               <a:rPr lang="en-US" smtClean="0"/>
-              <a:t>10/16/2017</a:t>
+              <a:t>10/18/2017</a:t>
             </a:fld>
             <a:endParaRPr lang="en-US"/>
           </a:p>
@@ -15867,7 +15867,7 @@
           <a:p>
             <a:fld id="{D088F999-7A4E-6B4F-9FED-EF75B73AD044}" type="datetimeFigureOut">
               <a:rPr lang="en-US" smtClean="0"/>
-              <a:t>10/16/2017</a:t>
+              <a:t>10/18/2017</a:t>
             </a:fld>
             <a:endParaRPr lang="en-US"/>
           </a:p>
@@ -16035,7 +16035,7 @@
           <a:p>
             <a:fld id="{D088F999-7A4E-6B4F-9FED-EF75B73AD044}" type="datetimeFigureOut">
               <a:rPr lang="en-US" smtClean="0"/>
-              <a:t>10/16/2017</a:t>
+              <a:t>10/18/2017</a:t>
             </a:fld>
             <a:endParaRPr lang="en-US"/>
           </a:p>
@@ -16213,7 +16213,7 @@
           <a:p>
             <a:fld id="{D088F999-7A4E-6B4F-9FED-EF75B73AD044}" type="datetimeFigureOut">
               <a:rPr lang="en-US" smtClean="0"/>
-              <a:t>10/16/2017</a:t>
+              <a:t>10/18/2017</a:t>
             </a:fld>
             <a:endParaRPr lang="en-US"/>
           </a:p>
@@ -16454,7 +16454,7 @@
             <a:fld id="{3FE51E94-D08C-431E-88FC-7EB62E529A19}" type="datetimeFigureOut">
               <a:rPr lang="en-US" smtClean="0"/>
               <a:pPr/>
-              <a:t>10/16/2017</a:t>
+              <a:t>10/18/2017</a:t>
             </a:fld>
             <a:endParaRPr lang="en-US"/>
           </a:p>
@@ -16624,7 +16624,7 @@
             <a:fld id="{3FE51E94-D08C-431E-88FC-7EB62E529A19}" type="datetimeFigureOut">
               <a:rPr lang="en-US" smtClean="0"/>
               <a:pPr/>
-              <a:t>10/16/2017</a:t>
+              <a:t>10/18/2017</a:t>
             </a:fld>
             <a:endParaRPr lang="en-US"/>
           </a:p>
@@ -16871,7 +16871,7 @@
             <a:fld id="{3FE51E94-D08C-431E-88FC-7EB62E529A19}" type="datetimeFigureOut">
               <a:rPr lang="en-US" smtClean="0"/>
               <a:pPr/>
-              <a:t>10/16/2017</a:t>
+              <a:t>10/18/2017</a:t>
             </a:fld>
             <a:endParaRPr lang="en-US"/>
           </a:p>
@@ -17158,7 +17158,7 @@
             <a:fld id="{3FE51E94-D08C-431E-88FC-7EB62E529A19}" type="datetimeFigureOut">
               <a:rPr lang="en-US" smtClean="0"/>
               <a:pPr/>
-              <a:t>10/16/2017</a:t>
+              <a:t>10/18/2017</a:t>
             </a:fld>
             <a:endParaRPr lang="en-US"/>
           </a:p>
@@ -17579,7 +17579,7 @@
             <a:fld id="{3FE51E94-D08C-431E-88FC-7EB62E529A19}" type="datetimeFigureOut">
               <a:rPr lang="en-US" smtClean="0"/>
               <a:pPr/>
-              <a:t>10/16/2017</a:t>
+              <a:t>10/18/2017</a:t>
             </a:fld>
             <a:endParaRPr lang="en-US"/>
           </a:p>
@@ -17698,7 +17698,7 @@
             <a:fld id="{3FE51E94-D08C-431E-88FC-7EB62E529A19}" type="datetimeFigureOut">
               <a:rPr lang="en-US" smtClean="0"/>
               <a:pPr/>
-              <a:t>10/16/2017</a:t>
+              <a:t>10/18/2017</a:t>
             </a:fld>
             <a:endParaRPr lang="en-US"/>
           </a:p>
@@ -17795,7 +17795,7 @@
             <a:fld id="{3FE51E94-D08C-431E-88FC-7EB62E529A19}" type="datetimeFigureOut">
               <a:rPr lang="en-US" smtClean="0"/>
               <a:pPr/>
-              <a:t>10/16/2017</a:t>
+              <a:t>10/18/2017</a:t>
             </a:fld>
             <a:endParaRPr lang="en-US"/>
           </a:p>
@@ -18071,7 +18071,7 @@
           <a:p>
             <a:fld id="{38B92EED-EC5D-481D-8393-A7289D5F8955}" type="datetimeFigureOut">
               <a:rPr lang="en-US" smtClean="0"/>
-              <a:t>10/16/2017</a:t>
+              <a:t>10/18/2017</a:t>
             </a:fld>
             <a:endParaRPr lang="en-US"/>
           </a:p>
@@ -18348,7 +18348,7 @@
             <a:fld id="{3FE51E94-D08C-431E-88FC-7EB62E529A19}" type="datetimeFigureOut">
               <a:rPr lang="en-US" smtClean="0"/>
               <a:pPr/>
-              <a:t>10/16/2017</a:t>
+              <a:t>10/18/2017</a:t>
             </a:fld>
             <a:endParaRPr lang="en-US"/>
           </a:p>
@@ -18605,7 +18605,7 @@
             <a:fld id="{3FE51E94-D08C-431E-88FC-7EB62E529A19}" type="datetimeFigureOut">
               <a:rPr lang="en-US" smtClean="0"/>
               <a:pPr/>
-              <a:t>10/16/2017</a:t>
+              <a:t>10/18/2017</a:t>
             </a:fld>
             <a:endParaRPr lang="en-US"/>
           </a:p>
@@ -18775,7 +18775,7 @@
             <a:fld id="{3FE51E94-D08C-431E-88FC-7EB62E529A19}" type="datetimeFigureOut">
               <a:rPr lang="en-US" smtClean="0"/>
               <a:pPr/>
-              <a:t>10/16/2017</a:t>
+              <a:t>10/18/2017</a:t>
             </a:fld>
             <a:endParaRPr lang="en-US"/>
           </a:p>
@@ -18955,7 +18955,7 @@
             <a:fld id="{3FE51E94-D08C-431E-88FC-7EB62E529A19}" type="datetimeFigureOut">
               <a:rPr lang="en-US" smtClean="0"/>
               <a:pPr/>
-              <a:t>10/16/2017</a:t>
+              <a:t>10/18/2017</a:t>
             </a:fld>
             <a:endParaRPr lang="en-US"/>
           </a:p>
@@ -19206,7 +19206,7 @@
               <a:pPr>
                 <a:defRPr/>
               </a:pPr>
-              <a:t>10/16/2017</a:t>
+              <a:t>10/18/2017</a:t>
             </a:fld>
             <a:endParaRPr lang="en-US"/>
           </a:p>
@@ -19380,7 +19380,7 @@
               <a:pPr>
                 <a:defRPr/>
               </a:pPr>
-              <a:t>10/16/2017</a:t>
+              <a:t>10/18/2017</a:t>
             </a:fld>
             <a:endParaRPr lang="en-US"/>
           </a:p>
@@ -19619,7 +19619,7 @@
               <a:pPr>
                 <a:defRPr/>
               </a:pPr>
-              <a:t>10/16/2017</a:t>
+              <a:t>10/18/2017</a:t>
             </a:fld>
             <a:endParaRPr lang="en-US"/>
           </a:p>
@@ -19898,7 +19898,7 @@
               <a:pPr>
                 <a:defRPr/>
               </a:pPr>
-              <a:t>10/16/2017</a:t>
+              <a:t>10/18/2017</a:t>
             </a:fld>
             <a:endParaRPr lang="en-US"/>
           </a:p>
@@ -20316,7 +20316,7 @@
               <a:pPr>
                 <a:defRPr/>
               </a:pPr>
-              <a:t>10/16/2017</a:t>
+              <a:t>10/18/2017</a:t>
             </a:fld>
             <a:endParaRPr lang="en-US"/>
           </a:p>
@@ -20427,7 +20427,7 @@
               <a:pPr>
                 <a:defRPr/>
               </a:pPr>
-              <a:t>10/16/2017</a:t>
+              <a:t>10/18/2017</a:t>
             </a:fld>
             <a:endParaRPr lang="en-US"/>
           </a:p>
@@ -20666,7 +20666,7 @@
           <a:p>
             <a:fld id="{38B92EED-EC5D-481D-8393-A7289D5F8955}" type="datetimeFigureOut">
               <a:rPr lang="en-US" smtClean="0"/>
-              <a:t>10/16/2017</a:t>
+              <a:t>10/18/2017</a:t>
             </a:fld>
             <a:endParaRPr lang="en-US"/>
           </a:p>
@@ -20772,7 +20772,7 @@
               <a:pPr>
                 <a:defRPr/>
               </a:pPr>
-              <a:t>10/16/2017</a:t>
+              <a:t>10/18/2017</a:t>
             </a:fld>
             <a:endParaRPr lang="en-US"/>
           </a:p>
@@ -21041,7 +21041,7 @@
               <a:pPr>
                 <a:defRPr/>
               </a:pPr>
-              <a:t>10/16/2017</a:t>
+              <a:t>10/18/2017</a:t>
             </a:fld>
             <a:endParaRPr lang="en-US"/>
           </a:p>
@@ -21293,7 +21293,7 @@
               <a:pPr>
                 <a:defRPr/>
               </a:pPr>
-              <a:t>10/16/2017</a:t>
+              <a:t>10/18/2017</a:t>
             </a:fld>
             <a:endParaRPr lang="en-US"/>
           </a:p>
@@ -21455,7 +21455,7 @@
               <a:pPr>
                 <a:defRPr/>
               </a:pPr>
-              <a:t>10/16/2017</a:t>
+              <a:t>10/18/2017</a:t>
             </a:fld>
             <a:endParaRPr lang="en-US"/>
           </a:p>
@@ -21627,7 +21627,7 @@
               <a:pPr>
                 <a:defRPr/>
               </a:pPr>
-              <a:t>10/16/2017</a:t>
+              <a:t>10/18/2017</a:t>
             </a:fld>
             <a:endParaRPr lang="en-US"/>
           </a:p>
@@ -21831,7 +21831,7 @@
           <a:p>
             <a:fld id="{38B92EED-EC5D-481D-8393-A7289D5F8955}" type="datetimeFigureOut">
               <a:rPr lang="en-US" smtClean="0"/>
-              <a:t>10/16/2017</a:t>
+              <a:t>10/18/2017</a:t>
             </a:fld>
             <a:endParaRPr lang="en-US"/>
           </a:p>
@@ -22348,7 +22348,7 @@
           <a:p>
             <a:fld id="{D088F999-7A4E-6B4F-9FED-EF75B73AD044}" type="datetimeFigureOut">
               <a:rPr lang="en-US" smtClean="0"/>
-              <a:t>10/16/2017</a:t>
+              <a:t>10/18/2017</a:t>
             </a:fld>
             <a:endParaRPr lang="en-US"/>
           </a:p>
@@ -22868,7 +22868,7 @@
             <a:fld id="{3FE51E94-D08C-431E-88FC-7EB62E529A19}" type="datetimeFigureOut">
               <a:rPr lang="en-US" smtClean="0"/>
               <a:pPr/>
-              <a:t>10/16/2017</a:t>
+              <a:t>10/18/2017</a:t>
             </a:fld>
             <a:endParaRPr lang="en-US"/>
           </a:p>
@@ -23389,7 +23389,7 @@
           <a:p>
             <a:fld id="{D088F999-7A4E-6B4F-9FED-EF75B73AD044}" type="datetimeFigureOut">
               <a:rPr lang="en-US" smtClean="0"/>
-              <a:t>10/16/2017</a:t>
+              <a:t>10/18/2017</a:t>
             </a:fld>
             <a:endParaRPr lang="en-US"/>
           </a:p>
@@ -23909,7 +23909,7 @@
             <a:fld id="{3FE51E94-D08C-431E-88FC-7EB62E529A19}" type="datetimeFigureOut">
               <a:rPr lang="en-US" smtClean="0"/>
               <a:pPr/>
-              <a:t>10/16/2017</a:t>
+              <a:t>10/18/2017</a:t>
             </a:fld>
             <a:endParaRPr lang="en-US"/>
           </a:p>
@@ -24430,7 +24430,7 @@
           <a:p>
             <a:fld id="{D088F999-7A4E-6B4F-9FED-EF75B73AD044}" type="datetimeFigureOut">
               <a:rPr lang="en-US" smtClean="0"/>
-              <a:t>10/16/2017</a:t>
+              <a:t>10/18/2017</a:t>
             </a:fld>
             <a:endParaRPr lang="en-US"/>
           </a:p>
@@ -24947,7 +24947,7 @@
           <a:p>
             <a:fld id="{D088F999-7A4E-6B4F-9FED-EF75B73AD044}" type="datetimeFigureOut">
               <a:rPr lang="en-US" smtClean="0"/>
-              <a:t>10/16/2017</a:t>
+              <a:t>10/18/2017</a:t>
             </a:fld>
             <a:endParaRPr lang="en-US"/>
           </a:p>
@@ -25500,7 +25500,7 @@
               <a:pPr>
                 <a:defRPr/>
               </a:pPr>
-              <a:t>10/16/2017</a:t>
+              <a:t>10/18/2017</a:t>
             </a:fld>
             <a:endParaRPr lang="en-US"/>
           </a:p>
@@ -47500,20 +47500,25 @@
           <a:p>
             <a:r>
               <a:rPr lang="en-US" dirty="0"/>
+              <a:t>Dynamic Data Masking (DDM) </a:t>
+            </a:r>
+          </a:p>
+          <a:p>
+            <a:r>
+              <a:rPr lang="en-US" dirty="0"/>
               <a:t>Column Level Encryption </a:t>
             </a:r>
           </a:p>
           <a:p>
             <a:r>
               <a:rPr lang="en-US" dirty="0"/>
-              <a:t>Transparent Data Encryption (TDE)</a:t>
-            </a:r>
-          </a:p>
-          <a:p>
-            <a:r>
-              <a:rPr lang="en-US" dirty="0"/>
-              <a:t>Dynamic Data Masking (DDM)</a:t>
-            </a:r>
+              <a:t>Transparent Data Encryption (</a:t>
+            </a:r>
+            <a:r>
+              <a:rPr lang="en-US"/>
+              <a:t>TDE)</a:t>
+            </a:r>
+            <a:endParaRPr lang="en-US" dirty="0"/>
           </a:p>
           <a:p>
             <a:r>

</xml_diff>

<commit_message>
fixed spelling error, added Azure changes for Vulnerabliity Assessment
</commit_message>
<xml_diff>
--- a/ATourofSQLServer2016SecurityFeatures.pptx
+++ b/ATourofSQLServer2016SecurityFeatures.pptx
@@ -45485,39 +45485,6 @@
       </p:graphicFrame>
       <p:cxnSp>
         <p:nvCxnSpPr>
-          <p:cNvPr id="55" name="Straight Arrow Connector 54"/>
-          <p:cNvCxnSpPr/>
-          <p:nvPr/>
-        </p:nvCxnSpPr>
-        <p:spPr>
-          <a:xfrm>
-            <a:off x="9316228" y="3020121"/>
-            <a:ext cx="0" cy="1257816"/>
-          </a:xfrm>
-          <a:prstGeom prst="straightConnector1">
-            <a:avLst/>
-          </a:prstGeom>
-          <a:ln>
-            <a:tailEnd type="triangle"/>
-          </a:ln>
-        </p:spPr>
-        <p:style>
-          <a:lnRef idx="2">
-            <a:schemeClr val="accent1"/>
-          </a:lnRef>
-          <a:fillRef idx="0">
-            <a:schemeClr val="accent1"/>
-          </a:fillRef>
-          <a:effectRef idx="1">
-            <a:schemeClr val="accent1"/>
-          </a:effectRef>
-          <a:fontRef idx="minor">
-            <a:schemeClr val="tx1"/>
-          </a:fontRef>
-        </p:style>
-      </p:cxnSp>
-      <p:cxnSp>
-        <p:nvCxnSpPr>
           <p:cNvPr id="57" name="Straight Arrow Connector 56"/>
           <p:cNvCxnSpPr/>
           <p:nvPr/>
@@ -47366,15 +47333,7 @@
           <a:p>
             <a:r>
               <a:rPr lang="en-US" dirty="0"/>
-              <a:t>The screening is done with a security predicate that examines the “user </a:t>
-            </a:r>
-            <a:r>
-              <a:rPr lang="en-US" dirty="0" err="1"/>
-              <a:t>chracteristics</a:t>
-            </a:r>
-            <a:r>
-              <a:rPr lang="en-US" dirty="0"/>
-              <a:t>” and returns a 1 for visible rows</a:t>
+              <a:t>The screening is done with a security predicate that examines the “user characteristics” and returns a 1 for visible rows</a:t>
             </a:r>
           </a:p>
           <a:p>
@@ -49978,7 +49937,7 @@
           <a:p>
             <a:r>
               <a:rPr lang="en-US" dirty="0"/>
-              <a:t>NOT SECURITY</a:t>
+              <a:t>This is NOT SECURITY</a:t>
             </a:r>
           </a:p>
         </p:txBody>
@@ -52645,6 +52604,14 @@
                 <a:sym typeface="Wingdings" panose="05000000000000000000" pitchFamily="2" charset="2"/>
               </a:rPr>
               <a:t>Threat Detection available</a:t>
+            </a:r>
+          </a:p>
+          <a:p>
+            <a:r>
+              <a:rPr lang="en-US" dirty="0">
+                <a:sym typeface="Wingdings" panose="05000000000000000000" pitchFamily="2" charset="2"/>
+              </a:rPr>
+              <a:t>Vulnerability Assessment in public preview</a:t>
             </a:r>
             <a:endParaRPr lang="en-US" dirty="0"/>
           </a:p>

</xml_diff>